<commit_message>
double linked list changes : VP
</commit_message>
<xml_diff>
--- a/Data Structures using C#/data-structures-using-.net-core-csharp/Linked List/Circular Linked List/Circular Linked List.pptx
+++ b/Data Structures using C#/data-structures-using-.net-core-csharp/Linked List/Circular Linked List/Circular Linked List.pptx
@@ -207,7 +207,7 @@
           <a:p>
             <a:fld id="{2FB6FFA2-5596-DA47-A26B-229D3D705C9C}" type="datetimeFigureOut">
               <a:rPr lang="en-US" smtClean="0"/>
-              <a:t>1/1/22</a:t>
+              <a:t>5/26/22</a:t>
             </a:fld>
             <a:endParaRPr lang="en-US"/>
           </a:p>
@@ -1545,7 +1545,7 @@
           <a:p>
             <a:fld id="{D7AFABE5-C7E3-F145-818B-F1C9F2CF8384}" type="datetimeFigureOut">
               <a:rPr lang="en-US" smtClean="0"/>
-              <a:t>1/1/22</a:t>
+              <a:t>5/26/22</a:t>
             </a:fld>
             <a:endParaRPr lang="en-US"/>
           </a:p>
@@ -1743,7 +1743,7 @@
           <a:p>
             <a:fld id="{D7AFABE5-C7E3-F145-818B-F1C9F2CF8384}" type="datetimeFigureOut">
               <a:rPr lang="en-US" smtClean="0"/>
-              <a:t>1/1/22</a:t>
+              <a:t>5/26/22</a:t>
             </a:fld>
             <a:endParaRPr lang="en-US"/>
           </a:p>
@@ -1951,7 +1951,7 @@
           <a:p>
             <a:fld id="{D7AFABE5-C7E3-F145-818B-F1C9F2CF8384}" type="datetimeFigureOut">
               <a:rPr lang="en-US" smtClean="0"/>
-              <a:t>1/1/22</a:t>
+              <a:t>5/26/22</a:t>
             </a:fld>
             <a:endParaRPr lang="en-US"/>
           </a:p>
@@ -2149,7 +2149,7 @@
           <a:p>
             <a:fld id="{D7AFABE5-C7E3-F145-818B-F1C9F2CF8384}" type="datetimeFigureOut">
               <a:rPr lang="en-US" smtClean="0"/>
-              <a:t>1/1/22</a:t>
+              <a:t>5/26/22</a:t>
             </a:fld>
             <a:endParaRPr lang="en-US"/>
           </a:p>
@@ -2424,7 +2424,7 @@
           <a:p>
             <a:fld id="{D7AFABE5-C7E3-F145-818B-F1C9F2CF8384}" type="datetimeFigureOut">
               <a:rPr lang="en-US" smtClean="0"/>
-              <a:t>1/1/22</a:t>
+              <a:t>5/26/22</a:t>
             </a:fld>
             <a:endParaRPr lang="en-US"/>
           </a:p>
@@ -2689,7 +2689,7 @@
           <a:p>
             <a:fld id="{D7AFABE5-C7E3-F145-818B-F1C9F2CF8384}" type="datetimeFigureOut">
               <a:rPr lang="en-US" smtClean="0"/>
-              <a:t>1/1/22</a:t>
+              <a:t>5/26/22</a:t>
             </a:fld>
             <a:endParaRPr lang="en-US"/>
           </a:p>
@@ -3101,7 +3101,7 @@
           <a:p>
             <a:fld id="{D7AFABE5-C7E3-F145-818B-F1C9F2CF8384}" type="datetimeFigureOut">
               <a:rPr lang="en-US" smtClean="0"/>
-              <a:t>1/1/22</a:t>
+              <a:t>5/26/22</a:t>
             </a:fld>
             <a:endParaRPr lang="en-US"/>
           </a:p>
@@ -3242,7 +3242,7 @@
           <a:p>
             <a:fld id="{D7AFABE5-C7E3-F145-818B-F1C9F2CF8384}" type="datetimeFigureOut">
               <a:rPr lang="en-US" smtClean="0"/>
-              <a:t>1/1/22</a:t>
+              <a:t>5/26/22</a:t>
             </a:fld>
             <a:endParaRPr lang="en-US"/>
           </a:p>
@@ -3355,7 +3355,7 @@
           <a:p>
             <a:fld id="{D7AFABE5-C7E3-F145-818B-F1C9F2CF8384}" type="datetimeFigureOut">
               <a:rPr lang="en-US" smtClean="0"/>
-              <a:t>1/1/22</a:t>
+              <a:t>5/26/22</a:t>
             </a:fld>
             <a:endParaRPr lang="en-US"/>
           </a:p>
@@ -3666,7 +3666,7 @@
           <a:p>
             <a:fld id="{D7AFABE5-C7E3-F145-818B-F1C9F2CF8384}" type="datetimeFigureOut">
               <a:rPr lang="en-US" smtClean="0"/>
-              <a:t>1/1/22</a:t>
+              <a:t>5/26/22</a:t>
             </a:fld>
             <a:endParaRPr lang="en-US"/>
           </a:p>
@@ -3954,7 +3954,7 @@
           <a:p>
             <a:fld id="{D7AFABE5-C7E3-F145-818B-F1C9F2CF8384}" type="datetimeFigureOut">
               <a:rPr lang="en-US" smtClean="0"/>
-              <a:t>1/1/22</a:t>
+              <a:t>5/26/22</a:t>
             </a:fld>
             <a:endParaRPr lang="en-US"/>
           </a:p>
@@ -4195,7 +4195,7 @@
           <a:p>
             <a:fld id="{D7AFABE5-C7E3-F145-818B-F1C9F2CF8384}" type="datetimeFigureOut">
               <a:rPr lang="en-US" smtClean="0"/>
-              <a:t>1/1/22</a:t>
+              <a:t>5/26/22</a:t>
             </a:fld>
             <a:endParaRPr lang="en-US"/>
           </a:p>
@@ -7618,80 +7618,6 @@
             <a:endParaRPr lang="en-US" sz="2000" dirty="0"/>
           </a:p>
           <a:p>
-            <a:endParaRPr lang="en-US" dirty="0"/>
-          </a:p>
-        </p:txBody>
-      </p:sp>
-      <p:sp>
-        <p:nvSpPr>
-          <p:cNvPr id="12" name="TextBox 11">
-            <a:extLst>
-              <a:ext uri="{FF2B5EF4-FFF2-40B4-BE49-F238E27FC236}">
-                <a16:creationId xmlns:a16="http://schemas.microsoft.com/office/drawing/2014/main" id="{4A1757EB-3A18-5044-AC4F-F3ED72C9D30B}"/>
-              </a:ext>
-            </a:extLst>
-          </p:cNvPr>
-          <p:cNvSpPr txBox="1"/>
-          <p:nvPr/>
-        </p:nvSpPr>
-        <p:spPr>
-          <a:xfrm>
-            <a:off x="383934" y="3745721"/>
-            <a:ext cx="5626607" cy="1754326"/>
-          </a:xfrm>
-          <a:prstGeom prst="rect">
-            <a:avLst/>
-          </a:prstGeom>
-          <a:noFill/>
-          <a:effectLst>
-            <a:glow rad="63500">
-              <a:schemeClr val="accent2">
-                <a:satMod val="175000"/>
-                <a:alpha val="0"/>
-              </a:schemeClr>
-            </a:glow>
-          </a:effectLst>
-        </p:spPr>
-        <p:txBody>
-          <a:bodyPr wrap="square" rtlCol="0">
-            <a:spAutoFit/>
-          </a:bodyPr>
-          <a:lstStyle/>
-          <a:p>
-            <a:r>
-              <a:rPr lang="en-US" dirty="0"/>
-              <a:t>main()</a:t>
-            </a:r>
-          </a:p>
-          <a:p>
-            <a:r>
-              <a:rPr lang="en-US" dirty="0"/>
-              <a:t>{</a:t>
-            </a:r>
-          </a:p>
-          <a:p>
-            <a:r>
-              <a:rPr lang="en-US" dirty="0"/>
-              <a:t>       int a[]={1,2,3};</a:t>
-            </a:r>
-          </a:p>
-          <a:p>
-            <a:r>
-              <a:rPr lang="en-US" dirty="0"/>
-              <a:t>       printf(“%d %d %d”,a[0],a[1],a[2]);</a:t>
-            </a:r>
-          </a:p>
-          <a:p>
-            <a:r>
-              <a:rPr lang="en-US" dirty="0"/>
-              <a:t>}</a:t>
-            </a:r>
-          </a:p>
-          <a:p>
-            <a:r>
-              <a:rPr lang="en-US" b="1" dirty="0"/>
-              <a:t>Output:1 2 3</a:t>
-            </a:r>
             <a:endParaRPr lang="en-US" dirty="0"/>
           </a:p>
         </p:txBody>
@@ -12376,7 +12302,7 @@
             <a:r>
               <a:rPr lang="en-US" sz="1400" dirty="0">
                 <a:solidFill>
-                  <a:srgbClr val="787878"/>
+                  <a:srgbClr val="39CC8F"/>
                 </a:solidFill>
               </a:rPr>
               <a:t>Creation</a:t>
@@ -19648,10 +19574,10 @@
         </p:nvGrpSpPr>
         <p:grpSpPr>
           <a:xfrm>
-            <a:off x="6622276" y="5376457"/>
-            <a:ext cx="1145762" cy="338554"/>
-            <a:chOff x="6461660" y="2598490"/>
-            <a:chExt cx="1145762" cy="338554"/>
+            <a:off x="6499357" y="5376457"/>
+            <a:ext cx="1268681" cy="338554"/>
+            <a:chOff x="6338741" y="2598490"/>
+            <a:chExt cx="1268681" cy="338554"/>
           </a:xfrm>
         </p:grpSpPr>
         <p:sp>
@@ -19668,8 +19594,8 @@
           </p:nvSpPr>
           <p:spPr>
             <a:xfrm>
-              <a:off x="6461660" y="2598490"/>
-              <a:ext cx="514172" cy="338554"/>
+              <a:off x="6338741" y="2598490"/>
+              <a:ext cx="637091" cy="338554"/>
             </a:xfrm>
             <a:prstGeom prst="rect">
               <a:avLst/>
@@ -19713,7 +19639,7 @@
                     <a:schemeClr val="tx1"/>
                   </a:solidFill>
                 </a:rPr>
-                <a:t>top</a:t>
+                <a:t>head</a:t>
               </a:r>
             </a:p>
           </p:txBody>

</xml_diff>